<commit_message>
added two email verification apis
</commit_message>
<xml_diff>
--- a/BasicPresentationListTemplate.pptx
+++ b/BasicPresentationListTemplate.pptx
@@ -232,7 +232,7 @@
           <a:p>
             <a:fld id="{F51E393C-541F-43DA-983A-4CDC99ADF6BA}" type="datetimeFigureOut">
               <a:rPr lang="en-US" smtClean="0"/>
-              <a:t>4/12/2024</a:t>
+              <a:t>4/28/2024</a:t>
             </a:fld>
             <a:endParaRPr lang="en-US"/>
           </a:p>
@@ -2753,7 +2753,7 @@
           <a:p>
             <a:fld id="{5BCAD085-E8A6-8845-BD4E-CB4CCA059FC4}" type="datetimeFigureOut">
               <a:rPr lang="en-US" smtClean="0"/>
-              <a:t>4/12/2024</a:t>
+              <a:t>4/28/2024</a:t>
             </a:fld>
             <a:endParaRPr lang="en-US"/>
           </a:p>
@@ -2921,7 +2921,7 @@
           <a:p>
             <a:fld id="{5BCAD085-E8A6-8845-BD4E-CB4CCA059FC4}" type="datetimeFigureOut">
               <a:rPr lang="en-US" smtClean="0"/>
-              <a:t>4/12/2024</a:t>
+              <a:t>4/28/2024</a:t>
             </a:fld>
             <a:endParaRPr lang="en-US"/>
           </a:p>
@@ -3099,7 +3099,7 @@
           <a:p>
             <a:fld id="{5BCAD085-E8A6-8845-BD4E-CB4CCA059FC4}" type="datetimeFigureOut">
               <a:rPr lang="en-US" smtClean="0"/>
-              <a:t>4/12/2024</a:t>
+              <a:t>4/28/2024</a:t>
             </a:fld>
             <a:endParaRPr lang="en-US"/>
           </a:p>
@@ -3267,7 +3267,7 @@
           <a:p>
             <a:fld id="{5BCAD085-E8A6-8845-BD4E-CB4CCA059FC4}" type="datetimeFigureOut">
               <a:rPr lang="en-US" smtClean="0"/>
-              <a:t>4/12/2024</a:t>
+              <a:t>4/28/2024</a:t>
             </a:fld>
             <a:endParaRPr lang="en-US"/>
           </a:p>
@@ -3512,7 +3512,7 @@
           <a:p>
             <a:fld id="{5BCAD085-E8A6-8845-BD4E-CB4CCA059FC4}" type="datetimeFigureOut">
               <a:rPr lang="en-US" smtClean="0"/>
-              <a:t>4/12/2024</a:t>
+              <a:t>4/28/2024</a:t>
             </a:fld>
             <a:endParaRPr lang="en-US"/>
           </a:p>
@@ -3797,7 +3797,7 @@
           <a:p>
             <a:fld id="{5BCAD085-E8A6-8845-BD4E-CB4CCA059FC4}" type="datetimeFigureOut">
               <a:rPr lang="en-US" smtClean="0"/>
-              <a:t>4/12/2024</a:t>
+              <a:t>4/28/2024</a:t>
             </a:fld>
             <a:endParaRPr lang="en-US"/>
           </a:p>
@@ -4216,7 +4216,7 @@
           <a:p>
             <a:fld id="{5BCAD085-E8A6-8845-BD4E-CB4CCA059FC4}" type="datetimeFigureOut">
               <a:rPr lang="en-US" smtClean="0"/>
-              <a:t>4/12/2024</a:t>
+              <a:t>4/28/2024</a:t>
             </a:fld>
             <a:endParaRPr lang="en-US"/>
           </a:p>
@@ -4333,7 +4333,7 @@
           <a:p>
             <a:fld id="{5BCAD085-E8A6-8845-BD4E-CB4CCA059FC4}" type="datetimeFigureOut">
               <a:rPr lang="en-US" smtClean="0"/>
-              <a:t>4/12/2024</a:t>
+              <a:t>4/28/2024</a:t>
             </a:fld>
             <a:endParaRPr lang="en-US"/>
           </a:p>
@@ -4428,7 +4428,7 @@
           <a:p>
             <a:fld id="{5BCAD085-E8A6-8845-BD4E-CB4CCA059FC4}" type="datetimeFigureOut">
               <a:rPr lang="en-US" smtClean="0"/>
-              <a:t>4/12/2024</a:t>
+              <a:t>4/28/2024</a:t>
             </a:fld>
             <a:endParaRPr lang="en-US"/>
           </a:p>
@@ -4703,7 +4703,7 @@
           <a:p>
             <a:fld id="{5BCAD085-E8A6-8845-BD4E-CB4CCA059FC4}" type="datetimeFigureOut">
               <a:rPr lang="en-US" smtClean="0"/>
-              <a:t>4/12/2024</a:t>
+              <a:t>4/28/2024</a:t>
             </a:fld>
             <a:endParaRPr lang="en-US"/>
           </a:p>
@@ -4955,7 +4955,7 @@
           <a:p>
             <a:fld id="{5BCAD085-E8A6-8845-BD4E-CB4CCA059FC4}" type="datetimeFigureOut">
               <a:rPr lang="en-US" smtClean="0"/>
-              <a:t>4/12/2024</a:t>
+              <a:t>4/28/2024</a:t>
             </a:fld>
             <a:endParaRPr lang="en-US"/>
           </a:p>
@@ -5169,7 +5169,7 @@
           <a:p>
             <a:fld id="{5BCAD085-E8A6-8845-BD4E-CB4CCA059FC4}" type="datetimeFigureOut">
               <a:rPr lang="en-US" smtClean="0"/>
-              <a:t>4/12/2024</a:t>
+              <a:t>4/28/2024</a:t>
             </a:fld>
             <a:endParaRPr lang="en-US"/>
           </a:p>

</xml_diff>